<commit_message>
Update file presentasi PPT
</commit_message>
<xml_diff>
--- a/PPT Project UMKM Toko.pptx
+++ b/PPT Project UMKM Toko.pptx
@@ -7924,205 +7924,102 @@
         </p:nvGrpSpPr>
         <p:grpSpPr>
           <a:xfrm rot="0">
-            <a:off x="5377308" y="6939924"/>
-            <a:ext cx="8482644" cy="3237133"/>
+            <a:off x="1324257" y="6914923"/>
+            <a:ext cx="7304678" cy="2289420"/>
             <a:chOff x="0" y="0"/>
-            <a:chExt cx="11310192" cy="4316177"/>
+            <a:chExt cx="1923866" cy="602975"/>
           </a:xfrm>
         </p:grpSpPr>
-        <p:grpSp>
-          <p:nvGrpSpPr>
-            <p:cNvPr name="Group 9" id="9"/>
-            <p:cNvGrpSpPr/>
-            <p:nvPr/>
-          </p:nvGrpSpPr>
-          <p:grpSpPr>
-            <a:xfrm rot="0">
-              <a:off x="0" y="0"/>
-              <a:ext cx="9739571" cy="3052560"/>
-              <a:chOff x="0" y="0"/>
-              <a:chExt cx="1923866" cy="602975"/>
-            </a:xfrm>
-          </p:grpSpPr>
-          <p:sp>
-            <p:nvSpPr>
-              <p:cNvPr name="Freeform 10" id="10"/>
-              <p:cNvSpPr/>
-              <p:nvPr/>
-            </p:nvSpPr>
-            <p:spPr>
-              <a:xfrm flipH="false" flipV="false" rot="0">
-                <a:off x="0" y="0"/>
-                <a:ext cx="1923866" cy="602975"/>
-              </a:xfrm>
-              <a:custGeom>
-                <a:avLst/>
-                <a:gdLst/>
-                <a:ahLst/>
-                <a:cxnLst/>
-                <a:rect r="r" b="b" t="t" l="l"/>
-                <a:pathLst>
-                  <a:path h="602975" w="1923866">
-                    <a:moveTo>
-                      <a:pt x="12718" y="0"/>
-                    </a:moveTo>
-                    <a:lnTo>
-                      <a:pt x="1911148" y="0"/>
-                    </a:lnTo>
-                    <a:cubicBezTo>
-                      <a:pt x="1918172" y="0"/>
-                      <a:pt x="1923866" y="5694"/>
-                      <a:pt x="1923866" y="12718"/>
-                    </a:cubicBezTo>
-                    <a:lnTo>
-                      <a:pt x="1923866" y="590257"/>
-                    </a:lnTo>
-                    <a:cubicBezTo>
-                      <a:pt x="1923866" y="597281"/>
-                      <a:pt x="1918172" y="602975"/>
-                      <a:pt x="1911148" y="602975"/>
-                    </a:cubicBezTo>
-                    <a:lnTo>
-                      <a:pt x="12718" y="602975"/>
-                    </a:lnTo>
-                    <a:cubicBezTo>
-                      <a:pt x="9345" y="602975"/>
-                      <a:pt x="6110" y="601635"/>
-                      <a:pt x="3725" y="599250"/>
-                    </a:cubicBezTo>
-                    <a:cubicBezTo>
-                      <a:pt x="1340" y="596865"/>
-                      <a:pt x="0" y="593630"/>
-                      <a:pt x="0" y="590257"/>
-                    </a:cubicBezTo>
-                    <a:lnTo>
-                      <a:pt x="0" y="12718"/>
-                    </a:lnTo>
-                    <a:cubicBezTo>
-                      <a:pt x="0" y="5694"/>
-                      <a:pt x="5694" y="0"/>
-                      <a:pt x="12718" y="0"/>
-                    </a:cubicBezTo>
-                    <a:close/>
-                  </a:path>
-                </a:pathLst>
-              </a:custGeom>
-              <a:solidFill>
-                <a:srgbClr val="FFCFC9"/>
-              </a:solidFill>
-            </p:spPr>
-          </p:sp>
-          <p:sp>
-            <p:nvSpPr>
-              <p:cNvPr name="TextBox 11" id="11"/>
-              <p:cNvSpPr txBox="true"/>
-              <p:nvPr/>
-            </p:nvSpPr>
-            <p:spPr>
-              <a:xfrm>
-                <a:off x="0" y="-47625"/>
-                <a:ext cx="1923866" cy="650600"/>
-              </a:xfrm>
-              <a:prstGeom prst="rect">
-                <a:avLst/>
-              </a:prstGeom>
-            </p:spPr>
-            <p:txBody>
-              <a:bodyPr anchor="ctr" rtlCol="false" tIns="50800" lIns="50800" bIns="50800" rIns="50800"/>
-              <a:lstStyle/>
-              <a:p>
-                <a:pPr algn="ctr">
-                  <a:lnSpc>
-                    <a:spcPts val="2659"/>
-                  </a:lnSpc>
-                  <a:spcBef>
-                    <a:spcPct val="0"/>
-                  </a:spcBef>
-                </a:pPr>
-              </a:p>
-            </p:txBody>
-          </p:sp>
-        </p:grpSp>
         <p:sp>
           <p:nvSpPr>
-            <p:cNvPr name="TextBox 12" id="12"/>
+            <p:cNvPr name="Freeform 9" id="9"/>
+            <p:cNvSpPr/>
+            <p:nvPr/>
+          </p:nvSpPr>
+          <p:spPr>
+            <a:xfrm flipH="false" flipV="false" rot="0">
+              <a:off x="0" y="0"/>
+              <a:ext cx="1923866" cy="602975"/>
+            </a:xfrm>
+            <a:custGeom>
+              <a:avLst/>
+              <a:gdLst/>
+              <a:ahLst/>
+              <a:cxnLst/>
+              <a:rect r="r" b="b" t="t" l="l"/>
+              <a:pathLst>
+                <a:path h="602975" w="1923866">
+                  <a:moveTo>
+                    <a:pt x="12718" y="0"/>
+                  </a:moveTo>
+                  <a:lnTo>
+                    <a:pt x="1911148" y="0"/>
+                  </a:lnTo>
+                  <a:cubicBezTo>
+                    <a:pt x="1918172" y="0"/>
+                    <a:pt x="1923866" y="5694"/>
+                    <a:pt x="1923866" y="12718"/>
+                  </a:cubicBezTo>
+                  <a:lnTo>
+                    <a:pt x="1923866" y="590257"/>
+                  </a:lnTo>
+                  <a:cubicBezTo>
+                    <a:pt x="1923866" y="597281"/>
+                    <a:pt x="1918172" y="602975"/>
+                    <a:pt x="1911148" y="602975"/>
+                  </a:cubicBezTo>
+                  <a:lnTo>
+                    <a:pt x="12718" y="602975"/>
+                  </a:lnTo>
+                  <a:cubicBezTo>
+                    <a:pt x="9345" y="602975"/>
+                    <a:pt x="6110" y="601635"/>
+                    <a:pt x="3725" y="599250"/>
+                  </a:cubicBezTo>
+                  <a:cubicBezTo>
+                    <a:pt x="1340" y="596865"/>
+                    <a:pt x="0" y="593630"/>
+                    <a:pt x="0" y="590257"/>
+                  </a:cubicBezTo>
+                  <a:lnTo>
+                    <a:pt x="0" y="12718"/>
+                  </a:lnTo>
+                  <a:cubicBezTo>
+                    <a:pt x="0" y="5694"/>
+                    <a:pt x="5694" y="0"/>
+                    <a:pt x="12718" y="0"/>
+                  </a:cubicBezTo>
+                  <a:close/>
+                </a:path>
+              </a:pathLst>
+            </a:custGeom>
+            <a:solidFill>
+              <a:srgbClr val="FFCFC9"/>
+            </a:solidFill>
+          </p:spPr>
+        </p:sp>
+        <p:sp>
+          <p:nvSpPr>
+            <p:cNvPr name="TextBox 10" id="10"/>
             <p:cNvSpPr txBox="true"/>
             <p:nvPr/>
           </p:nvSpPr>
           <p:spPr>
-            <a:xfrm rot="0">
-              <a:off x="453723" y="250858"/>
-              <a:ext cx="8466430" cy="2516505"/>
+            <a:xfrm>
+              <a:off x="0" y="-47625"/>
+              <a:ext cx="1923866" cy="650600"/>
             </a:xfrm>
             <a:prstGeom prst="rect">
               <a:avLst/>
             </a:prstGeom>
           </p:spPr>
           <p:txBody>
-            <a:bodyPr anchor="t" rtlCol="false" tIns="0" lIns="0" bIns="0" rIns="0">
-              <a:spAutoFit/>
-            </a:bodyPr>
+            <a:bodyPr anchor="ctr" rtlCol="false" tIns="50800" lIns="50800" bIns="50800" rIns="50800"/>
             <a:lstStyle/>
             <a:p>
-              <a:pPr algn="ctr" marL="0" indent="0" lvl="0">
+              <a:pPr algn="ctr">
                 <a:lnSpc>
-                  <a:spcPts val="5040"/>
-                </a:lnSpc>
-                <a:spcBef>
-                  <a:spcPct val="0"/>
-                </a:spcBef>
-              </a:pPr>
-              <a:r>
-                <a:rPr lang="en-US" sz="3600">
-                  <a:solidFill>
-                    <a:srgbClr val="06545D"/>
-                  </a:solidFill>
-                  <a:latin typeface="Cloud"/>
-                  <a:ea typeface="Cloud"/>
-                  <a:cs typeface="Cloud"/>
-                  <a:sym typeface="Cloud"/>
-                </a:rPr>
-                <a:t>Cont</a:t>
-              </a:r>
-              <a:r>
-                <a:rPr lang="en-US" sz="3600" strike="noStrike" u="none">
-                  <a:solidFill>
-                    <a:srgbClr val="06545D"/>
-                  </a:solidFill>
-                  <a:latin typeface="Cloud"/>
-                  <a:ea typeface="Cloud"/>
-                  <a:cs typeface="Cloud"/>
-                  <a:sym typeface="Cloud"/>
-                </a:rPr>
-                <a:t>act Person:</a:t>
-              </a:r>
-            </a:p>
-            <a:p>
-              <a:pPr algn="ctr" marL="0" indent="0" lvl="0">
-                <a:lnSpc>
-                  <a:spcPts val="5040"/>
-                </a:lnSpc>
-                <a:spcBef>
-                  <a:spcPct val="0"/>
-                </a:spcBef>
-              </a:pPr>
-              <a:r>
-                <a:rPr lang="en-US" sz="3600" strike="noStrike" u="none">
-                  <a:solidFill>
-                    <a:srgbClr val="06545D"/>
-                  </a:solidFill>
-                  <a:latin typeface="Cloud"/>
-                  <a:ea typeface="Cloud"/>
-                  <a:cs typeface="Cloud"/>
-                  <a:sym typeface="Cloud"/>
-                </a:rPr>
-                <a:t> </a:t>
-              </a:r>
-            </a:p>
-            <a:p>
-              <a:pPr algn="ctr" marL="0" indent="0" lvl="0">
-                <a:lnSpc>
-                  <a:spcPts val="5040"/>
+                  <a:spcPts val="2659"/>
                 </a:lnSpc>
                 <a:spcBef>
                   <a:spcPct val="0"/>
@@ -8131,130 +8028,319 @@
             </a:p>
           </p:txBody>
         </p:sp>
+      </p:grpSp>
+      <p:sp>
+        <p:nvSpPr>
+          <p:cNvPr name="TextBox 11" id="11"/>
+          <p:cNvSpPr txBox="true"/>
+          <p:nvPr/>
+        </p:nvSpPr>
+        <p:spPr>
+          <a:xfrm rot="0">
+            <a:off x="1664549" y="7081635"/>
+            <a:ext cx="6349823" cy="632482"/>
+          </a:xfrm>
+          <a:prstGeom prst="rect">
+            <a:avLst/>
+          </a:prstGeom>
+        </p:spPr>
+        <p:txBody>
+          <a:bodyPr anchor="t" rtlCol="false" tIns="0" lIns="0" bIns="0" rIns="0">
+            <a:spAutoFit/>
+          </a:bodyPr>
+          <a:lstStyle/>
+          <a:p>
+            <a:pPr algn="ctr" marL="0" indent="0" lvl="0">
+              <a:lnSpc>
+                <a:spcPts val="5040"/>
+              </a:lnSpc>
+              <a:spcBef>
+                <a:spcPct val="0"/>
+              </a:spcBef>
+            </a:pPr>
+            <a:r>
+              <a:rPr lang="en-US" sz="3600">
+                <a:solidFill>
+                  <a:srgbClr val="06545D"/>
+                </a:solidFill>
+                <a:latin typeface="Cloud"/>
+                <a:ea typeface="Cloud"/>
+                <a:cs typeface="Cloud"/>
+                <a:sym typeface="Cloud"/>
+              </a:rPr>
+              <a:t>Cont</a:t>
+            </a:r>
+            <a:r>
+              <a:rPr lang="en-US" sz="3600" strike="noStrike" u="none">
+                <a:solidFill>
+                  <a:srgbClr val="06545D"/>
+                </a:solidFill>
+                <a:latin typeface="Cloud"/>
+                <a:ea typeface="Cloud"/>
+                <a:cs typeface="Cloud"/>
+                <a:sym typeface="Cloud"/>
+              </a:rPr>
+              <a:t>act Person:</a:t>
+            </a:r>
+          </a:p>
+        </p:txBody>
+      </p:sp>
+      <p:sp>
+        <p:nvSpPr>
+          <p:cNvPr name="TextBox 12" id="12"/>
+          <p:cNvSpPr txBox="true"/>
+          <p:nvPr/>
+        </p:nvSpPr>
+        <p:spPr>
+          <a:xfrm rot="0">
+            <a:off x="3319942" y="7694605"/>
+            <a:ext cx="4009249" cy="1365320"/>
+          </a:xfrm>
+          <a:prstGeom prst="rect">
+            <a:avLst/>
+          </a:prstGeom>
+        </p:spPr>
+        <p:txBody>
+          <a:bodyPr anchor="t" rtlCol="false" tIns="0" lIns="0" bIns="0" rIns="0">
+            <a:spAutoFit/>
+          </a:bodyPr>
+          <a:lstStyle/>
+          <a:p>
+            <a:pPr algn="just" marL="0" indent="0" lvl="0">
+              <a:lnSpc>
+                <a:spcPts val="3660"/>
+              </a:lnSpc>
+              <a:spcBef>
+                <a:spcPct val="0"/>
+              </a:spcBef>
+            </a:pPr>
+            <a:r>
+              <a:rPr lang="en-US" sz="2614">
+                <a:solidFill>
+                  <a:srgbClr val="06545D"/>
+                </a:solidFill>
+                <a:latin typeface="Cloud"/>
+                <a:ea typeface="Cloud"/>
+                <a:cs typeface="Cloud"/>
+                <a:sym typeface="Cloud"/>
+              </a:rPr>
+              <a:t>0878889056420</a:t>
+            </a:r>
+            <a:r>
+              <a:rPr lang="en-US" sz="2614" strike="noStrike" u="none">
+                <a:solidFill>
+                  <a:srgbClr val="06545D"/>
+                </a:solidFill>
+                <a:latin typeface="Cloud"/>
+                <a:ea typeface="Cloud"/>
+                <a:cs typeface="Cloud"/>
+                <a:sym typeface="Cloud"/>
+              </a:rPr>
+              <a:t> (Alya)</a:t>
+            </a:r>
+          </a:p>
+          <a:p>
+            <a:pPr algn="just" marL="0" indent="0" lvl="0">
+              <a:lnSpc>
+                <a:spcPts val="3660"/>
+              </a:lnSpc>
+              <a:spcBef>
+                <a:spcPct val="0"/>
+              </a:spcBef>
+            </a:pPr>
+            <a:r>
+              <a:rPr lang="en-US" sz="2614" strike="noStrike" u="none">
+                <a:solidFill>
+                  <a:srgbClr val="06545D"/>
+                </a:solidFill>
+                <a:latin typeface="Cloud"/>
+                <a:ea typeface="Cloud"/>
+                <a:cs typeface="Cloud"/>
+                <a:sym typeface="Cloud"/>
+              </a:rPr>
+              <a:t>087791039341 (Nanda)</a:t>
+            </a:r>
+          </a:p>
+          <a:p>
+            <a:pPr algn="just" marL="0" indent="0" lvl="0">
+              <a:lnSpc>
+                <a:spcPts val="3660"/>
+              </a:lnSpc>
+              <a:spcBef>
+                <a:spcPct val="0"/>
+              </a:spcBef>
+            </a:pPr>
+            <a:r>
+              <a:rPr lang="en-US" sz="2614" strike="noStrike" u="none">
+                <a:solidFill>
+                  <a:srgbClr val="06545D"/>
+                </a:solidFill>
+                <a:latin typeface="Cloud"/>
+                <a:ea typeface="Cloud"/>
+                <a:cs typeface="Cloud"/>
+                <a:sym typeface="Cloud"/>
+              </a:rPr>
+              <a:t>089635876114 (Yusri)</a:t>
+            </a:r>
+          </a:p>
+        </p:txBody>
+      </p:sp>
+      <p:sp>
+        <p:nvSpPr>
+          <p:cNvPr name="Freeform 13" id="13"/>
+          <p:cNvSpPr/>
+          <p:nvPr/>
+        </p:nvSpPr>
+        <p:spPr>
+          <a:xfrm flipH="false" flipV="false" rot="0">
+            <a:off x="2311155" y="7751755"/>
+            <a:ext cx="732398" cy="732398"/>
+          </a:xfrm>
+          <a:custGeom>
+            <a:avLst/>
+            <a:gdLst/>
+            <a:ahLst/>
+            <a:cxnLst/>
+            <a:rect r="r" b="b" t="t" l="l"/>
+            <a:pathLst>
+              <a:path h="732398" w="732398">
+                <a:moveTo>
+                  <a:pt x="0" y="0"/>
+                </a:moveTo>
+                <a:lnTo>
+                  <a:pt x="732398" y="0"/>
+                </a:lnTo>
+                <a:lnTo>
+                  <a:pt x="732398" y="732399"/>
+                </a:lnTo>
+                <a:lnTo>
+                  <a:pt x="0" y="732399"/>
+                </a:lnTo>
+                <a:lnTo>
+                  <a:pt x="0" y="0"/>
+                </a:lnTo>
+                <a:close/>
+              </a:path>
+            </a:pathLst>
+          </a:custGeom>
+          <a:blipFill>
+            <a:blip r:embed="rId10">
+              <a:extLst>
+                <a:ext uri="{96DAC541-7B7A-43D3-8B79-37D633B846F1}">
+                  <asvg:svgBlip xmlns:asvg="http://schemas.microsoft.com/office/drawing/2016/SVG/main" r:embed="rId11"/>
+                </a:ext>
+              </a:extLst>
+            </a:blip>
+            <a:stretch>
+              <a:fillRect l="0" t="0" r="0" b="0"/>
+            </a:stretch>
+          </a:blipFill>
+        </p:spPr>
+      </p:sp>
+      <p:grpSp>
+        <p:nvGrpSpPr>
+          <p:cNvPr name="Group 14" id="14"/>
+          <p:cNvGrpSpPr/>
+          <p:nvPr/>
+        </p:nvGrpSpPr>
+        <p:grpSpPr>
+          <a:xfrm rot="0">
+            <a:off x="9527348" y="6939924"/>
+            <a:ext cx="7304678" cy="2289420"/>
+            <a:chOff x="0" y="0"/>
+            <a:chExt cx="1923866" cy="602975"/>
+          </a:xfrm>
+        </p:grpSpPr>
         <p:sp>
           <p:nvSpPr>
-            <p:cNvPr name="TextBox 13" id="13"/>
+            <p:cNvPr name="Freeform 15" id="15"/>
+            <p:cNvSpPr/>
+            <p:nvPr/>
+          </p:nvSpPr>
+          <p:spPr>
+            <a:xfrm flipH="false" flipV="false" rot="0">
+              <a:off x="0" y="0"/>
+              <a:ext cx="1923866" cy="602975"/>
+            </a:xfrm>
+            <a:custGeom>
+              <a:avLst/>
+              <a:gdLst/>
+              <a:ahLst/>
+              <a:cxnLst/>
+              <a:rect r="r" b="b" t="t" l="l"/>
+              <a:pathLst>
+                <a:path h="602975" w="1923866">
+                  <a:moveTo>
+                    <a:pt x="12718" y="0"/>
+                  </a:moveTo>
+                  <a:lnTo>
+                    <a:pt x="1911148" y="0"/>
+                  </a:lnTo>
+                  <a:cubicBezTo>
+                    <a:pt x="1918172" y="0"/>
+                    <a:pt x="1923866" y="5694"/>
+                    <a:pt x="1923866" y="12718"/>
+                  </a:cubicBezTo>
+                  <a:lnTo>
+                    <a:pt x="1923866" y="590257"/>
+                  </a:lnTo>
+                  <a:cubicBezTo>
+                    <a:pt x="1923866" y="597281"/>
+                    <a:pt x="1918172" y="602975"/>
+                    <a:pt x="1911148" y="602975"/>
+                  </a:cubicBezTo>
+                  <a:lnTo>
+                    <a:pt x="12718" y="602975"/>
+                  </a:lnTo>
+                  <a:cubicBezTo>
+                    <a:pt x="9345" y="602975"/>
+                    <a:pt x="6110" y="601635"/>
+                    <a:pt x="3725" y="599250"/>
+                  </a:cubicBezTo>
+                  <a:cubicBezTo>
+                    <a:pt x="1340" y="596865"/>
+                    <a:pt x="0" y="593630"/>
+                    <a:pt x="0" y="590257"/>
+                  </a:cubicBezTo>
+                  <a:lnTo>
+                    <a:pt x="0" y="12718"/>
+                  </a:lnTo>
+                  <a:cubicBezTo>
+                    <a:pt x="0" y="5694"/>
+                    <a:pt x="5694" y="0"/>
+                    <a:pt x="12718" y="0"/>
+                  </a:cubicBezTo>
+                  <a:close/>
+                </a:path>
+              </a:pathLst>
+            </a:custGeom>
+            <a:solidFill>
+              <a:srgbClr val="FFCFC9"/>
+            </a:solidFill>
+          </p:spPr>
+        </p:sp>
+        <p:sp>
+          <p:nvSpPr>
+            <p:cNvPr name="TextBox 16" id="16"/>
             <p:cNvSpPr txBox="true"/>
             <p:nvPr/>
           </p:nvSpPr>
           <p:spPr>
-            <a:xfrm rot="0">
-              <a:off x="2660914" y="1058627"/>
-              <a:ext cx="8649278" cy="3257550"/>
+            <a:xfrm>
+              <a:off x="0" y="-47625"/>
+              <a:ext cx="1923866" cy="650600"/>
             </a:xfrm>
             <a:prstGeom prst="rect">
               <a:avLst/>
             </a:prstGeom>
           </p:spPr>
           <p:txBody>
-            <a:bodyPr anchor="t" rtlCol="false" tIns="0" lIns="0" bIns="0" rIns="0">
-              <a:spAutoFit/>
-            </a:bodyPr>
+            <a:bodyPr anchor="ctr" rtlCol="false" tIns="50800" lIns="50800" bIns="50800" rIns="50800"/>
             <a:lstStyle/>
             <a:p>
-              <a:pPr algn="just" marL="0" indent="0" lvl="0">
+              <a:pPr algn="ctr">
                 <a:lnSpc>
-                  <a:spcPts val="3500"/>
-                </a:lnSpc>
-                <a:spcBef>
-                  <a:spcPct val="0"/>
-                </a:spcBef>
-              </a:pPr>
-              <a:r>
-                <a:rPr lang="en-US" sz="2500">
-                  <a:solidFill>
-                    <a:srgbClr val="06545D"/>
-                  </a:solidFill>
-                  <a:latin typeface="Cloud"/>
-                  <a:ea typeface="Cloud"/>
-                  <a:cs typeface="Cloud"/>
-                  <a:sym typeface="Cloud"/>
-                </a:rPr>
-                <a:t>0878889056420</a:t>
-              </a:r>
-              <a:r>
-                <a:rPr lang="en-US" sz="2500" strike="noStrike" u="none">
-                  <a:solidFill>
-                    <a:srgbClr val="06545D"/>
-                  </a:solidFill>
-                  <a:latin typeface="Cloud"/>
-                  <a:ea typeface="Cloud"/>
-                  <a:cs typeface="Cloud"/>
-                  <a:sym typeface="Cloud"/>
-                </a:rPr>
-                <a:t> (Alya)</a:t>
-              </a:r>
-            </a:p>
-            <a:p>
-              <a:pPr algn="just" marL="0" indent="0" lvl="0">
-                <a:lnSpc>
-                  <a:spcPts val="3500"/>
-                </a:lnSpc>
-                <a:spcBef>
-                  <a:spcPct val="0"/>
-                </a:spcBef>
-              </a:pPr>
-              <a:r>
-                <a:rPr lang="en-US" sz="2500" strike="noStrike" u="none">
-                  <a:solidFill>
-                    <a:srgbClr val="06545D"/>
-                  </a:solidFill>
-                  <a:latin typeface="Cloud"/>
-                  <a:ea typeface="Cloud"/>
-                  <a:cs typeface="Cloud"/>
-                  <a:sym typeface="Cloud"/>
-                </a:rPr>
-                <a:t>087791039341 (Nanda)</a:t>
-              </a:r>
-            </a:p>
-            <a:p>
-              <a:pPr algn="just" marL="0" indent="0" lvl="0">
-                <a:lnSpc>
-                  <a:spcPts val="3500"/>
-                </a:lnSpc>
-                <a:spcBef>
-                  <a:spcPct val="0"/>
-                </a:spcBef>
-              </a:pPr>
-              <a:r>
-                <a:rPr lang="en-US" sz="2500" strike="noStrike" u="none">
-                  <a:solidFill>
-                    <a:srgbClr val="06545D"/>
-                  </a:solidFill>
-                  <a:latin typeface="Cloud"/>
-                  <a:ea typeface="Cloud"/>
-                  <a:cs typeface="Cloud"/>
-                  <a:sym typeface="Cloud"/>
-                </a:rPr>
-                <a:t>089635876114 (Yusri)</a:t>
-              </a:r>
-            </a:p>
-            <a:p>
-              <a:pPr algn="just" marL="0" indent="0" lvl="0">
-                <a:lnSpc>
-                  <a:spcPts val="4339"/>
-                </a:lnSpc>
-                <a:spcBef>
-                  <a:spcPct val="0"/>
-                </a:spcBef>
-              </a:pPr>
-              <a:r>
-                <a:rPr lang="en-US" sz="3099" strike="noStrike" u="none">
-                  <a:solidFill>
-                    <a:srgbClr val="06545D"/>
-                  </a:solidFill>
-                  <a:latin typeface="Cloud"/>
-                  <a:ea typeface="Cloud"/>
-                  <a:cs typeface="Cloud"/>
-                  <a:sym typeface="Cloud"/>
-                </a:rPr>
-                <a:t> </a:t>
-              </a:r>
-            </a:p>
-            <a:p>
-              <a:pPr algn="just" marL="0" indent="0" lvl="0">
-                <a:lnSpc>
-                  <a:spcPts val="4899"/>
+                  <a:spcPts val="2659"/>
                 </a:lnSpc>
                 <a:spcBef>
                   <a:spcPct val="0"/>
@@ -8263,59 +8349,96 @@
             </a:p>
           </p:txBody>
         </p:sp>
-        <p:sp>
-          <p:nvSpPr>
-            <p:cNvPr name="Freeform 14" id="14"/>
-            <p:cNvSpPr/>
-            <p:nvPr/>
-          </p:nvSpPr>
-          <p:spPr>
-            <a:xfrm flipH="false" flipV="false" rot="0">
-              <a:off x="1315864" y="1115777"/>
-              <a:ext cx="976531" cy="976531"/>
-            </a:xfrm>
-            <a:custGeom>
-              <a:avLst/>
-              <a:gdLst/>
-              <a:ahLst/>
-              <a:cxnLst/>
-              <a:rect r="r" b="b" t="t" l="l"/>
-              <a:pathLst>
-                <a:path h="976531" w="976531">
-                  <a:moveTo>
-                    <a:pt x="0" y="0"/>
-                  </a:moveTo>
-                  <a:lnTo>
-                    <a:pt x="976531" y="0"/>
-                  </a:lnTo>
-                  <a:lnTo>
-                    <a:pt x="976531" y="976531"/>
-                  </a:lnTo>
-                  <a:lnTo>
-                    <a:pt x="0" y="976531"/>
-                  </a:lnTo>
-                  <a:lnTo>
-                    <a:pt x="0" y="0"/>
-                  </a:lnTo>
-                  <a:close/>
-                </a:path>
-              </a:pathLst>
-            </a:custGeom>
-            <a:blipFill>
-              <a:blip r:embed="rId10">
-                <a:extLst>
-                  <a:ext uri="{96DAC541-7B7A-43D3-8B79-37D633B846F1}">
-                    <asvg:svgBlip xmlns:asvg="http://schemas.microsoft.com/office/drawing/2016/SVG/main" r:embed="rId11"/>
-                  </a:ext>
-                </a:extLst>
-              </a:blip>
-              <a:stretch>
-                <a:fillRect l="0" t="0" r="0" b="0"/>
-              </a:stretch>
-            </a:blipFill>
-          </p:spPr>
-        </p:sp>
       </p:grpSp>
+      <p:sp>
+        <p:nvSpPr>
+          <p:cNvPr name="TextBox 17" id="17"/>
+          <p:cNvSpPr txBox="true"/>
+          <p:nvPr/>
+        </p:nvSpPr>
+        <p:spPr>
+          <a:xfrm rot="0">
+            <a:off x="9972421" y="7081635"/>
+            <a:ext cx="6349823" cy="632482"/>
+          </a:xfrm>
+          <a:prstGeom prst="rect">
+            <a:avLst/>
+          </a:prstGeom>
+        </p:spPr>
+        <p:txBody>
+          <a:bodyPr anchor="t" rtlCol="false" tIns="0" lIns="0" bIns="0" rIns="0">
+            <a:spAutoFit/>
+          </a:bodyPr>
+          <a:lstStyle/>
+          <a:p>
+            <a:pPr algn="ctr" marL="0" indent="0" lvl="0">
+              <a:lnSpc>
+                <a:spcPts val="5040"/>
+              </a:lnSpc>
+              <a:spcBef>
+                <a:spcPct val="0"/>
+              </a:spcBef>
+            </a:pPr>
+            <a:r>
+              <a:rPr lang="en-US" sz="3600">
+                <a:solidFill>
+                  <a:srgbClr val="06545D"/>
+                </a:solidFill>
+                <a:latin typeface="Cloud"/>
+                <a:ea typeface="Cloud"/>
+                <a:cs typeface="Cloud"/>
+                <a:sym typeface="Cloud"/>
+              </a:rPr>
+              <a:t>Repository:</a:t>
+            </a:r>
+          </a:p>
+        </p:txBody>
+      </p:sp>
+      <p:sp>
+        <p:nvSpPr>
+          <p:cNvPr name="TextBox 18" id="18"/>
+          <p:cNvSpPr txBox="true"/>
+          <p:nvPr/>
+        </p:nvSpPr>
+        <p:spPr>
+          <a:xfrm rot="0">
+            <a:off x="11175063" y="7885567"/>
+            <a:ext cx="4009249" cy="905094"/>
+          </a:xfrm>
+          <a:prstGeom prst="rect">
+            <a:avLst/>
+          </a:prstGeom>
+        </p:spPr>
+        <p:txBody>
+          <a:bodyPr anchor="t" rtlCol="false" tIns="0" lIns="0" bIns="0" rIns="0">
+            <a:spAutoFit/>
+          </a:bodyPr>
+          <a:lstStyle/>
+          <a:p>
+            <a:pPr algn="ctr" marL="0" indent="0" lvl="0">
+              <a:lnSpc>
+                <a:spcPts val="3660"/>
+              </a:lnSpc>
+              <a:spcBef>
+                <a:spcPct val="0"/>
+              </a:spcBef>
+            </a:pPr>
+            <a:r>
+              <a:rPr lang="en-US" sz="2614" u="sng">
+                <a:solidFill>
+                  <a:srgbClr val="06545D"/>
+                </a:solidFill>
+                <a:latin typeface="Cloud"/>
+                <a:ea typeface="Cloud"/>
+                <a:cs typeface="Cloud"/>
+                <a:sym typeface="Cloud"/>
+                <a:hlinkClick r:id="rId12" tooltip="https://github.com/yuzhuruuu/UMKM-Toko"/>
+              </a:rPr>
+              <a:t>https://github.com/yuzhuruuu/UMKM-Toko</a:t>
+            </a:r>
+          </a:p>
+        </p:txBody>
+      </p:sp>
     </p:spTree>
   </p:cSld>
   <p:clrMapOvr>

</xml_diff>